<commit_message>
big changes and stuff
</commit_message>
<xml_diff>
--- a/assessment/wireframes.pptx
+++ b/assessment/wireframes.pptx
@@ -8,6 +8,9 @@
     <p:sldId id="256" r:id="rId2"/>
     <p:sldId id="257" r:id="rId3"/>
     <p:sldId id="258" r:id="rId4"/>
+    <p:sldId id="259" r:id="rId5"/>
+    <p:sldId id="260" r:id="rId6"/>
+    <p:sldId id="261" r:id="rId7"/>
   </p:sldIdLst>
   <p:sldSz cx="12192000" cy="6858000"/>
   <p:notesSz cx="6858000" cy="9144000"/>
@@ -106,6 +109,11 @@
       </a:defRPr>
     </a:lvl9pPr>
   </p:defaultTextStyle>
+  <p:extLst>
+    <p:ext uri="{EFAFB233-063F-42B5-8137-9DF3F51BA10A}">
+      <p15:sldGuideLst xmlns:p15="http://schemas.microsoft.com/office/powerpoint/2012/main"/>
+    </p:ext>
+  </p:extLst>
 </p:presentation>
 </file>
 
@@ -258,7 +266,7 @@
           <a:p>
             <a:fld id="{9FCBD368-052B-4CC7-AEAC-2C6B33DA0A61}" type="datetimeFigureOut">
               <a:rPr lang="en-NZ" smtClean="0"/>
-              <a:t>7/08/2018</a:t>
+              <a:t>13/08/2018</a:t>
             </a:fld>
             <a:endParaRPr lang="en-NZ"/>
           </a:p>
@@ -458,7 +466,7 @@
           <a:p>
             <a:fld id="{9FCBD368-052B-4CC7-AEAC-2C6B33DA0A61}" type="datetimeFigureOut">
               <a:rPr lang="en-NZ" smtClean="0"/>
-              <a:t>7/08/2018</a:t>
+              <a:t>13/08/2018</a:t>
             </a:fld>
             <a:endParaRPr lang="en-NZ"/>
           </a:p>
@@ -668,7 +676,7 @@
           <a:p>
             <a:fld id="{9FCBD368-052B-4CC7-AEAC-2C6B33DA0A61}" type="datetimeFigureOut">
               <a:rPr lang="en-NZ" smtClean="0"/>
-              <a:t>7/08/2018</a:t>
+              <a:t>13/08/2018</a:t>
             </a:fld>
             <a:endParaRPr lang="en-NZ"/>
           </a:p>
@@ -868,7 +876,7 @@
           <a:p>
             <a:fld id="{9FCBD368-052B-4CC7-AEAC-2C6B33DA0A61}" type="datetimeFigureOut">
               <a:rPr lang="en-NZ" smtClean="0"/>
-              <a:t>7/08/2018</a:t>
+              <a:t>13/08/2018</a:t>
             </a:fld>
             <a:endParaRPr lang="en-NZ"/>
           </a:p>
@@ -1144,7 +1152,7 @@
           <a:p>
             <a:fld id="{9FCBD368-052B-4CC7-AEAC-2C6B33DA0A61}" type="datetimeFigureOut">
               <a:rPr lang="en-NZ" smtClean="0"/>
-              <a:t>7/08/2018</a:t>
+              <a:t>13/08/2018</a:t>
             </a:fld>
             <a:endParaRPr lang="en-NZ"/>
           </a:p>
@@ -1412,7 +1420,7 @@
           <a:p>
             <a:fld id="{9FCBD368-052B-4CC7-AEAC-2C6B33DA0A61}" type="datetimeFigureOut">
               <a:rPr lang="en-NZ" smtClean="0"/>
-              <a:t>7/08/2018</a:t>
+              <a:t>13/08/2018</a:t>
             </a:fld>
             <a:endParaRPr lang="en-NZ"/>
           </a:p>
@@ -1827,7 +1835,7 @@
           <a:p>
             <a:fld id="{9FCBD368-052B-4CC7-AEAC-2C6B33DA0A61}" type="datetimeFigureOut">
               <a:rPr lang="en-NZ" smtClean="0"/>
-              <a:t>7/08/2018</a:t>
+              <a:t>13/08/2018</a:t>
             </a:fld>
             <a:endParaRPr lang="en-NZ"/>
           </a:p>
@@ -1969,7 +1977,7 @@
           <a:p>
             <a:fld id="{9FCBD368-052B-4CC7-AEAC-2C6B33DA0A61}" type="datetimeFigureOut">
               <a:rPr lang="en-NZ" smtClean="0"/>
-              <a:t>7/08/2018</a:t>
+              <a:t>13/08/2018</a:t>
             </a:fld>
             <a:endParaRPr lang="en-NZ"/>
           </a:p>
@@ -2082,7 +2090,7 @@
           <a:p>
             <a:fld id="{9FCBD368-052B-4CC7-AEAC-2C6B33DA0A61}" type="datetimeFigureOut">
               <a:rPr lang="en-NZ" smtClean="0"/>
-              <a:t>7/08/2018</a:t>
+              <a:t>13/08/2018</a:t>
             </a:fld>
             <a:endParaRPr lang="en-NZ"/>
           </a:p>
@@ -2395,7 +2403,7 @@
           <a:p>
             <a:fld id="{9FCBD368-052B-4CC7-AEAC-2C6B33DA0A61}" type="datetimeFigureOut">
               <a:rPr lang="en-NZ" smtClean="0"/>
-              <a:t>7/08/2018</a:t>
+              <a:t>13/08/2018</a:t>
             </a:fld>
             <a:endParaRPr lang="en-NZ"/>
           </a:p>
@@ -2684,7 +2692,7 @@
           <a:p>
             <a:fld id="{9FCBD368-052B-4CC7-AEAC-2C6B33DA0A61}" type="datetimeFigureOut">
               <a:rPr lang="en-NZ" smtClean="0"/>
-              <a:t>7/08/2018</a:t>
+              <a:t>13/08/2018</a:t>
             </a:fld>
             <a:endParaRPr lang="en-NZ"/>
           </a:p>
@@ -2927,7 +2935,7 @@
           <a:p>
             <a:fld id="{9FCBD368-052B-4CC7-AEAC-2C6B33DA0A61}" type="datetimeFigureOut">
               <a:rPr lang="en-NZ" smtClean="0"/>
-              <a:t>7/08/2018</a:t>
+              <a:t>13/08/2018</a:t>
             </a:fld>
             <a:endParaRPr lang="en-NZ"/>
           </a:p>
@@ -7638,6 +7646,418 @@
 </p:sld>
 </file>
 
+<file path=ppt/slides/slide4.xml><?xml version="1.0" encoding="utf-8"?>
+<p:sld xmlns:a="http://schemas.openxmlformats.org/drawingml/2006/main" xmlns:r="http://schemas.openxmlformats.org/officeDocument/2006/relationships" xmlns:p="http://schemas.openxmlformats.org/presentationml/2006/main">
+  <p:cSld>
+    <p:spTree>
+      <p:nvGrpSpPr>
+        <p:cNvPr id="1" name=""/>
+        <p:cNvGrpSpPr/>
+        <p:nvPr/>
+      </p:nvGrpSpPr>
+      <p:grpSpPr>
+        <a:xfrm>
+          <a:off x="0" y="0"/>
+          <a:ext cx="0" cy="0"/>
+          <a:chOff x="0" y="0"/>
+          <a:chExt cx="0" cy="0"/>
+        </a:xfrm>
+      </p:grpSpPr>
+      <p:grpSp>
+        <p:nvGrpSpPr>
+          <p:cNvPr id="7" name="Group 6">
+            <a:extLst>
+              <a:ext uri="{FF2B5EF4-FFF2-40B4-BE49-F238E27FC236}">
+                <a16:creationId xmlns:a16="http://schemas.microsoft.com/office/drawing/2014/main" id="{0EA197A4-66A0-43A5-843B-292F352CB359}"/>
+              </a:ext>
+            </a:extLst>
+          </p:cNvPr>
+          <p:cNvGrpSpPr/>
+          <p:nvPr/>
+        </p:nvGrpSpPr>
+        <p:grpSpPr>
+          <a:xfrm>
+            <a:off x="-7061989" y="0"/>
+            <a:ext cx="12235598" cy="14142239"/>
+            <a:chOff x="-33659" y="301546"/>
+            <a:chExt cx="12235598" cy="14142239"/>
+          </a:xfrm>
+        </p:grpSpPr>
+        <p:pic>
+          <p:nvPicPr>
+            <p:cNvPr id="4" name="Picture 3">
+              <a:extLst>
+                <a:ext uri="{FF2B5EF4-FFF2-40B4-BE49-F238E27FC236}">
+                  <a16:creationId xmlns:a16="http://schemas.microsoft.com/office/drawing/2014/main" id="{837B79B3-E0D6-40B7-8B41-9CB95C41A5E5}"/>
+                </a:ext>
+              </a:extLst>
+            </p:cNvPr>
+            <p:cNvPicPr>
+              <a:picLocks noChangeAspect="1"/>
+            </p:cNvPicPr>
+            <p:nvPr/>
+          </p:nvPicPr>
+          <p:blipFill>
+            <a:blip r:embed="rId2"/>
+            <a:stretch>
+              <a:fillRect/>
+            </a:stretch>
+          </p:blipFill>
+          <p:spPr>
+            <a:xfrm>
+              <a:off x="0" y="301546"/>
+              <a:ext cx="12192000" cy="6254908"/>
+            </a:xfrm>
+            <a:prstGeom prst="rect">
+              <a:avLst/>
+            </a:prstGeom>
+          </p:spPr>
+        </p:pic>
+        <p:pic>
+          <p:nvPicPr>
+            <p:cNvPr id="5" name="Picture 4">
+              <a:extLst>
+                <a:ext uri="{FF2B5EF4-FFF2-40B4-BE49-F238E27FC236}">
+                  <a16:creationId xmlns:a16="http://schemas.microsoft.com/office/drawing/2014/main" id="{9CC30A1C-7420-4D61-AFE6-3B631C49CA20}"/>
+                </a:ext>
+              </a:extLst>
+            </p:cNvPr>
+            <p:cNvPicPr>
+              <a:picLocks noChangeAspect="1"/>
+            </p:cNvPicPr>
+            <p:nvPr/>
+          </p:nvPicPr>
+          <p:blipFill>
+            <a:blip r:embed="rId3"/>
+            <a:stretch>
+              <a:fillRect/>
+            </a:stretch>
+          </p:blipFill>
+          <p:spPr>
+            <a:xfrm>
+              <a:off x="-33659" y="6325888"/>
+              <a:ext cx="12235598" cy="6246240"/>
+            </a:xfrm>
+            <a:prstGeom prst="rect">
+              <a:avLst/>
+            </a:prstGeom>
+          </p:spPr>
+        </p:pic>
+        <p:pic>
+          <p:nvPicPr>
+            <p:cNvPr id="6" name="Picture 5">
+              <a:extLst>
+                <a:ext uri="{FF2B5EF4-FFF2-40B4-BE49-F238E27FC236}">
+                  <a16:creationId xmlns:a16="http://schemas.microsoft.com/office/drawing/2014/main" id="{0100E180-AD99-45A5-A5BD-03084F99266A}"/>
+                </a:ext>
+              </a:extLst>
+            </p:cNvPr>
+            <p:cNvPicPr>
+              <a:picLocks noChangeAspect="1"/>
+            </p:cNvPicPr>
+            <p:nvPr/>
+          </p:nvPicPr>
+          <p:blipFill>
+            <a:blip r:embed="rId4"/>
+            <a:stretch>
+              <a:fillRect/>
+            </a:stretch>
+          </p:blipFill>
+          <p:spPr>
+            <a:xfrm>
+              <a:off x="-21126" y="12375271"/>
+              <a:ext cx="12208288" cy="2068514"/>
+            </a:xfrm>
+            <a:prstGeom prst="rect">
+              <a:avLst/>
+            </a:prstGeom>
+          </p:spPr>
+        </p:pic>
+      </p:grpSp>
+      <p:pic>
+        <p:nvPicPr>
+          <p:cNvPr id="9" name="Picture 8">
+            <a:extLst>
+              <a:ext uri="{FF2B5EF4-FFF2-40B4-BE49-F238E27FC236}">
+                <a16:creationId xmlns:a16="http://schemas.microsoft.com/office/drawing/2014/main" id="{2E3CB6D0-680A-4179-B600-E13841A65916}"/>
+              </a:ext>
+            </a:extLst>
+          </p:cNvPr>
+          <p:cNvPicPr>
+            <a:picLocks noChangeAspect="1"/>
+          </p:cNvPicPr>
+          <p:nvPr/>
+        </p:nvPicPr>
+        <p:blipFill rotWithShape="1">
+          <a:blip r:embed="rId5">
+            <a:extLst>
+              <a:ext uri="{28A0092B-C50C-407E-A947-70E740481C1C}">
+                <a14:useLocalDpi xmlns:a14="http://schemas.microsoft.com/office/drawing/2010/main" val="0"/>
+              </a:ext>
+            </a:extLst>
+          </a:blip>
+          <a:srcRect l="811" t="1047" r="1078" b="819"/>
+          <a:stretch/>
+        </p:blipFill>
+        <p:spPr>
+          <a:xfrm>
+            <a:off x="1810871" y="-954325"/>
+            <a:ext cx="13016754" cy="15042776"/>
+          </a:xfrm>
+          <a:prstGeom prst="rect">
+            <a:avLst/>
+          </a:prstGeom>
+        </p:spPr>
+      </p:pic>
+    </p:spTree>
+    <p:extLst>
+      <p:ext uri="{BB962C8B-B14F-4D97-AF65-F5344CB8AC3E}">
+        <p14:creationId xmlns:p14="http://schemas.microsoft.com/office/powerpoint/2010/main" val="3095891732"/>
+      </p:ext>
+    </p:extLst>
+  </p:cSld>
+  <p:clrMapOvr>
+    <a:masterClrMapping/>
+  </p:clrMapOvr>
+</p:sld>
+</file>
+
+<file path=ppt/slides/slide5.xml><?xml version="1.0" encoding="utf-8"?>
+<p:sld xmlns:a="http://schemas.openxmlformats.org/drawingml/2006/main" xmlns:r="http://schemas.openxmlformats.org/officeDocument/2006/relationships" xmlns:p="http://schemas.openxmlformats.org/presentationml/2006/main">
+  <p:cSld>
+    <p:spTree>
+      <p:nvGrpSpPr>
+        <p:cNvPr id="1" name=""/>
+        <p:cNvGrpSpPr/>
+        <p:nvPr/>
+      </p:nvGrpSpPr>
+      <p:grpSpPr>
+        <a:xfrm>
+          <a:off x="0" y="0"/>
+          <a:ext cx="0" cy="0"/>
+          <a:chOff x="0" y="0"/>
+          <a:chExt cx="0" cy="0"/>
+        </a:xfrm>
+      </p:grpSpPr>
+      <p:grpSp>
+        <p:nvGrpSpPr>
+          <p:cNvPr id="6" name="Group 5">
+            <a:extLst>
+              <a:ext uri="{FF2B5EF4-FFF2-40B4-BE49-F238E27FC236}">
+                <a16:creationId xmlns:a16="http://schemas.microsoft.com/office/drawing/2014/main" id="{ECB67849-934E-4D0B-BBF1-8548BF1354D5}"/>
+              </a:ext>
+            </a:extLst>
+          </p:cNvPr>
+          <p:cNvGrpSpPr/>
+          <p:nvPr/>
+        </p:nvGrpSpPr>
+        <p:grpSpPr>
+          <a:xfrm>
+            <a:off x="-8440615" y="-548923"/>
+            <a:ext cx="12201269" cy="8991294"/>
+            <a:chOff x="0" y="342031"/>
+            <a:chExt cx="12201269" cy="8991294"/>
+          </a:xfrm>
+        </p:grpSpPr>
+        <p:pic>
+          <p:nvPicPr>
+            <p:cNvPr id="5" name="Picture 4">
+              <a:extLst>
+                <a:ext uri="{FF2B5EF4-FFF2-40B4-BE49-F238E27FC236}">
+                  <a16:creationId xmlns:a16="http://schemas.microsoft.com/office/drawing/2014/main" id="{E2938255-D5CF-4924-AC69-0F7BE86F0C39}"/>
+                </a:ext>
+              </a:extLst>
+            </p:cNvPr>
+            <p:cNvPicPr>
+              <a:picLocks noChangeAspect="1"/>
+            </p:cNvPicPr>
+            <p:nvPr/>
+          </p:nvPicPr>
+          <p:blipFill>
+            <a:blip r:embed="rId2"/>
+            <a:stretch>
+              <a:fillRect/>
+            </a:stretch>
+          </p:blipFill>
+          <p:spPr>
+            <a:xfrm>
+              <a:off x="9269" y="4666498"/>
+              <a:ext cx="12192000" cy="4666827"/>
+            </a:xfrm>
+            <a:prstGeom prst="rect">
+              <a:avLst/>
+            </a:prstGeom>
+          </p:spPr>
+        </p:pic>
+        <p:pic>
+          <p:nvPicPr>
+            <p:cNvPr id="4" name="Picture 3">
+              <a:extLst>
+                <a:ext uri="{FF2B5EF4-FFF2-40B4-BE49-F238E27FC236}">
+                  <a16:creationId xmlns:a16="http://schemas.microsoft.com/office/drawing/2014/main" id="{D818D35C-1197-4EEE-95EB-A7A6C4781747}"/>
+                </a:ext>
+              </a:extLst>
+            </p:cNvPr>
+            <p:cNvPicPr>
+              <a:picLocks noChangeAspect="1"/>
+            </p:cNvPicPr>
+            <p:nvPr/>
+          </p:nvPicPr>
+          <p:blipFill>
+            <a:blip r:embed="rId3"/>
+            <a:stretch>
+              <a:fillRect/>
+            </a:stretch>
+          </p:blipFill>
+          <p:spPr>
+            <a:xfrm>
+              <a:off x="0" y="342031"/>
+              <a:ext cx="12192000" cy="6173937"/>
+            </a:xfrm>
+            <a:prstGeom prst="rect">
+              <a:avLst/>
+            </a:prstGeom>
+          </p:spPr>
+        </p:pic>
+      </p:grpSp>
+      <p:pic>
+        <p:nvPicPr>
+          <p:cNvPr id="8" name="Picture 7">
+            <a:extLst>
+              <a:ext uri="{FF2B5EF4-FFF2-40B4-BE49-F238E27FC236}">
+                <a16:creationId xmlns:a16="http://schemas.microsoft.com/office/drawing/2014/main" id="{81E5185C-898C-44B5-A593-67EA854E6E72}"/>
+              </a:ext>
+            </a:extLst>
+          </p:cNvPr>
+          <p:cNvPicPr>
+            <a:picLocks noChangeAspect="1"/>
+          </p:cNvPicPr>
+          <p:nvPr/>
+        </p:nvPicPr>
+        <p:blipFill rotWithShape="1">
+          <a:blip r:embed="rId4">
+            <a:extLst>
+              <a:ext uri="{28A0092B-C50C-407E-A947-70E740481C1C}">
+                <a14:useLocalDpi xmlns:a14="http://schemas.microsoft.com/office/drawing/2010/main" val="0"/>
+              </a:ext>
+            </a:extLst>
+          </a:blip>
+          <a:srcRect l="883" t="483" r="1387" b="2081"/>
+          <a:stretch/>
+        </p:blipFill>
+        <p:spPr>
+          <a:xfrm>
+            <a:off x="5017476" y="-515815"/>
+            <a:ext cx="9097109" cy="6682153"/>
+          </a:xfrm>
+          <a:prstGeom prst="rect">
+            <a:avLst/>
+          </a:prstGeom>
+        </p:spPr>
+      </p:pic>
+    </p:spTree>
+    <p:extLst>
+      <p:ext uri="{BB962C8B-B14F-4D97-AF65-F5344CB8AC3E}">
+        <p14:creationId xmlns:p14="http://schemas.microsoft.com/office/powerpoint/2010/main" val="419905785"/>
+      </p:ext>
+    </p:extLst>
+  </p:cSld>
+  <p:clrMapOvr>
+    <a:masterClrMapping/>
+  </p:clrMapOvr>
+</p:sld>
+</file>
+
+<file path=ppt/slides/slide6.xml><?xml version="1.0" encoding="utf-8"?>
+<p:sld xmlns:a="http://schemas.openxmlformats.org/drawingml/2006/main" xmlns:r="http://schemas.openxmlformats.org/officeDocument/2006/relationships" xmlns:p="http://schemas.openxmlformats.org/presentationml/2006/main">
+  <p:cSld>
+    <p:spTree>
+      <p:nvGrpSpPr>
+        <p:cNvPr id="1" name=""/>
+        <p:cNvGrpSpPr/>
+        <p:nvPr/>
+      </p:nvGrpSpPr>
+      <p:grpSpPr>
+        <a:xfrm>
+          <a:off x="0" y="0"/>
+          <a:ext cx="0" cy="0"/>
+          <a:chOff x="0" y="0"/>
+          <a:chExt cx="0" cy="0"/>
+        </a:xfrm>
+      </p:grpSpPr>
+      <p:pic>
+        <p:nvPicPr>
+          <p:cNvPr id="4" name="Picture 3">
+            <a:extLst>
+              <a:ext uri="{FF2B5EF4-FFF2-40B4-BE49-F238E27FC236}">
+                <a16:creationId xmlns:a16="http://schemas.microsoft.com/office/drawing/2014/main" id="{ABF0101E-230D-4BAF-9CC0-DA9096B5F758}"/>
+              </a:ext>
+            </a:extLst>
+          </p:cNvPr>
+          <p:cNvPicPr>
+            <a:picLocks noChangeAspect="1"/>
+          </p:cNvPicPr>
+          <p:nvPr/>
+        </p:nvPicPr>
+        <p:blipFill>
+          <a:blip r:embed="rId2"/>
+          <a:stretch>
+            <a:fillRect/>
+          </a:stretch>
+        </p:blipFill>
+        <p:spPr>
+          <a:xfrm>
+            <a:off x="0" y="2831420"/>
+            <a:ext cx="12192000" cy="1195159"/>
+          </a:xfrm>
+          <a:prstGeom prst="rect">
+            <a:avLst/>
+          </a:prstGeom>
+        </p:spPr>
+      </p:pic>
+      <p:pic>
+        <p:nvPicPr>
+          <p:cNvPr id="5" name="Picture 4">
+            <a:extLst>
+              <a:ext uri="{FF2B5EF4-FFF2-40B4-BE49-F238E27FC236}">
+                <a16:creationId xmlns:a16="http://schemas.microsoft.com/office/drawing/2014/main" id="{F4A5A4E7-B69E-4E99-80D6-8277DED965EA}"/>
+              </a:ext>
+            </a:extLst>
+          </p:cNvPr>
+          <p:cNvPicPr>
+            <a:picLocks noChangeAspect="1"/>
+          </p:cNvPicPr>
+          <p:nvPr/>
+        </p:nvPicPr>
+        <p:blipFill>
+          <a:blip r:embed="rId3"/>
+          <a:stretch>
+            <a:fillRect/>
+          </a:stretch>
+        </p:blipFill>
+        <p:spPr>
+          <a:xfrm>
+            <a:off x="0" y="4274444"/>
+            <a:ext cx="12192000" cy="325482"/>
+          </a:xfrm>
+          <a:prstGeom prst="rect">
+            <a:avLst/>
+          </a:prstGeom>
+        </p:spPr>
+      </p:pic>
+    </p:spTree>
+    <p:extLst>
+      <p:ext uri="{BB962C8B-B14F-4D97-AF65-F5344CB8AC3E}">
+        <p14:creationId xmlns:p14="http://schemas.microsoft.com/office/powerpoint/2010/main" val="1499672637"/>
+      </p:ext>
+    </p:extLst>
+  </p:cSld>
+  <p:clrMapOvr>
+    <a:masterClrMapping/>
+  </p:clrMapOvr>
+</p:sld>
+</file>
+
 <file path=ppt/theme/theme1.xml><?xml version="1.0" encoding="utf-8"?>
 <a:theme xmlns:a="http://schemas.openxmlformats.org/drawingml/2006/main" name="Office Theme">
   <a:themeElements>

</xml_diff>